<commit_message>
Updated slides about classes and objects
I had to add a lot more detail to my lectures on classes and objects, so I'm updating these slides to include the new ones I created.
</commit_message>
<xml_diff>
--- a/lectures/070_object_oriented_contd/Overloads-Properties.pptx
+++ b/lectures/070_object_oriented_contd/Overloads-Properties.pptx
@@ -5,10 +5,10 @@
     <p:sldMasterId id="2147483732" r:id="rId1"/>
   </p:sldMasterIdLst>
   <p:notesMasterIdLst>
-    <p:notesMasterId r:id="rId23"/>
+    <p:notesMasterId r:id="rId20"/>
   </p:notesMasterIdLst>
   <p:handoutMasterIdLst>
-    <p:handoutMasterId r:id="rId24"/>
+    <p:handoutMasterId r:id="rId21"/>
   </p:handoutMasterIdLst>
   <p:sldIdLst>
     <p:sldId id="256" r:id="rId2"/>
@@ -24,14 +24,11 @@
     <p:sldId id="340" r:id="rId12"/>
     <p:sldId id="338" r:id="rId13"/>
     <p:sldId id="342" r:id="rId14"/>
-    <p:sldId id="344" r:id="rId15"/>
-    <p:sldId id="345" r:id="rId16"/>
-    <p:sldId id="346" r:id="rId17"/>
-    <p:sldId id="353" r:id="rId18"/>
-    <p:sldId id="354" r:id="rId19"/>
-    <p:sldId id="355" r:id="rId20"/>
-    <p:sldId id="356" r:id="rId21"/>
-    <p:sldId id="352" r:id="rId22"/>
+    <p:sldId id="346" r:id="rId15"/>
+    <p:sldId id="353" r:id="rId16"/>
+    <p:sldId id="354" r:id="rId17"/>
+    <p:sldId id="355" r:id="rId18"/>
+    <p:sldId id="356" r:id="rId19"/>
   </p:sldIdLst>
   <p:sldSz cx="12188825" cy="6858000"/>
   <p:notesSz cx="6858000" cy="9144000"/>
@@ -3133,7 +3130,7 @@
           <a:p>
             <a:fld id="{2507D560-C4D4-4804-8CBF-2C56AB6C6DB9}" type="datetimeFigureOut">
               <a:rPr lang="en-US" smtClean="0"/>
-              <a:t>8/16/2021</a:t>
+              <a:t>9/30/2021</a:t>
             </a:fld>
             <a:endParaRPr lang="en-US"/>
           </a:p>
@@ -3298,7 +3295,7 @@
           <a:p>
             <a:fld id="{688E7586-9A7B-41FF-B169-85DADA744493}" type="datetimeFigureOut">
               <a:rPr lang="en-US" smtClean="0"/>
-              <a:t>8/16/2021</a:t>
+              <a:t>9/30/2021</a:t>
             </a:fld>
             <a:endParaRPr lang="en-US"/>
           </a:p>
@@ -11416,16 +11413,10 @@
           </a:p>
           <a:p>
             <a:r>
-              <a:rPr lang="en-US" b="1" dirty="0"/>
-              <a:t>Constructors in UML</a:t>
-            </a:r>
-          </a:p>
-          <a:p>
-            <a:r>
-              <a:rPr lang="en-US" dirty="0" smtClean="0"/>
+              <a:rPr lang="en-US" b="1" dirty="0" smtClean="0"/>
               <a:t>Properties</a:t>
             </a:r>
-            <a:endParaRPr lang="en-US" dirty="0"/>
+            <a:endParaRPr lang="en-US" b="1" dirty="0"/>
           </a:p>
         </p:txBody>
       </p:sp>
@@ -11460,7 +11451,7 @@
     </p:spTree>
     <p:extLst>
       <p:ext uri="{BB962C8B-B14F-4D97-AF65-F5344CB8AC3E}">
-        <p14:creationId xmlns:p14="http://schemas.microsoft.com/office/powerpoint/2010/main" val="3592068641"/>
+        <p14:creationId xmlns:p14="http://schemas.microsoft.com/office/powerpoint/2010/main" val="2094600139"/>
       </p:ext>
     </p:extLst>
   </p:cSld>
@@ -11489,735 +11480,6 @@
       </p:grpSpPr>
       <p:sp>
         <p:nvSpPr>
-          <p:cNvPr id="2" name="Title 1">
-            <a:extLst>
-              <a:ext uri="{FF2B5EF4-FFF2-40B4-BE49-F238E27FC236}">
-                <a16:creationId xmlns:a16="http://schemas.microsoft.com/office/drawing/2014/main" id="{DA1F0D16-91DD-4511-B780-BE7FA7C19075}"/>
-              </a:ext>
-            </a:extLst>
-          </p:cNvPr>
-          <p:cNvSpPr>
-            <a:spLocks noGrp="1"/>
-          </p:cNvSpPr>
-          <p:nvPr>
-            <p:ph type="title"/>
-          </p:nvPr>
-        </p:nvSpPr>
-        <p:spPr/>
-        <p:txBody>
-          <a:bodyPr/>
-          <a:lstStyle/>
-          <a:p>
-            <a:r>
-              <a:rPr lang="en-US" dirty="0"/>
-              <a:t>Constructors: Part of the Interface</a:t>
-            </a:r>
-          </a:p>
-        </p:txBody>
-      </p:sp>
-      <p:sp>
-        <p:nvSpPr>
-          <p:cNvPr id="3" name="Content Placeholder 2">
-            <a:extLst>
-              <a:ext uri="{FF2B5EF4-FFF2-40B4-BE49-F238E27FC236}">
-                <a16:creationId xmlns:a16="http://schemas.microsoft.com/office/drawing/2014/main" id="{EDA06314-4637-4537-AE40-0D009661E7F9}"/>
-              </a:ext>
-            </a:extLst>
-          </p:cNvPr>
-          <p:cNvSpPr>
-            <a:spLocks noGrp="1"/>
-          </p:cNvSpPr>
-          <p:nvPr>
-            <p:ph idx="1"/>
-          </p:nvPr>
-        </p:nvSpPr>
-        <p:spPr>
-          <a:xfrm>
-            <a:off x="227013" y="1371600"/>
-            <a:ext cx="11734800" cy="880414"/>
-          </a:xfrm>
-        </p:spPr>
-        <p:txBody>
-          <a:bodyPr/>
-          <a:lstStyle/>
-          <a:p>
-            <a:r>
-              <a:rPr lang="en-US" dirty="0"/>
-              <a:t>Non-default constructors should be planned in UML</a:t>
-            </a:r>
-          </a:p>
-        </p:txBody>
-      </p:sp>
-      <p:sp>
-        <p:nvSpPr>
-          <p:cNvPr id="4" name="Footer Placeholder 3">
-            <a:extLst>
-              <a:ext uri="{FF2B5EF4-FFF2-40B4-BE49-F238E27FC236}">
-                <a16:creationId xmlns:a16="http://schemas.microsoft.com/office/drawing/2014/main" id="{B91F9C59-7A5E-4B37-A297-C006D10CC002}"/>
-              </a:ext>
-            </a:extLst>
-          </p:cNvPr>
-          <p:cNvSpPr>
-            <a:spLocks noGrp="1"/>
-          </p:cNvSpPr>
-          <p:nvPr>
-            <p:ph type="ftr" sz="quarter" idx="11"/>
-          </p:nvPr>
-        </p:nvSpPr>
-        <p:spPr/>
-        <p:txBody>
-          <a:bodyPr/>
-          <a:lstStyle/>
-          <a:p>
-            <a:r>
-              <a:rPr lang="en-US"/>
-              <a:t>CSCI 1301</a:t>
-            </a:r>
-          </a:p>
-        </p:txBody>
-      </p:sp>
-      <p:sp>
-        <p:nvSpPr>
-          <p:cNvPr id="8" name="Rectangle 7">
-            <a:extLst>
-              <a:ext uri="{FF2B5EF4-FFF2-40B4-BE49-F238E27FC236}">
-                <a16:creationId xmlns:a16="http://schemas.microsoft.com/office/drawing/2014/main" id="{59CC17E4-4FB2-45E4-9E8E-A42BF8EEA954}"/>
-              </a:ext>
-            </a:extLst>
-          </p:cNvPr>
-          <p:cNvSpPr/>
-          <p:nvPr/>
-        </p:nvSpPr>
-        <p:spPr>
-          <a:xfrm>
-            <a:off x="1598611" y="2209800"/>
-            <a:ext cx="9220200" cy="3494900"/>
-          </a:xfrm>
-          <a:prstGeom prst="rect">
-            <a:avLst/>
-          </a:prstGeom>
-          <a:solidFill>
-            <a:schemeClr val="accent1">
-              <a:lumMod val="60000"/>
-              <a:lumOff val="40000"/>
-            </a:schemeClr>
-          </a:solidFill>
-          <a:ln>
-            <a:solidFill>
-              <a:srgbClr val="085091"/>
-            </a:solidFill>
-          </a:ln>
-        </p:spPr>
-        <p:style>
-          <a:lnRef idx="2">
-            <a:schemeClr val="accent1">
-              <a:shade val="50000"/>
-            </a:schemeClr>
-          </a:lnRef>
-          <a:fillRef idx="1">
-            <a:schemeClr val="accent1"/>
-          </a:fillRef>
-          <a:effectRef idx="0">
-            <a:schemeClr val="accent1"/>
-          </a:effectRef>
-          <a:fontRef idx="minor">
-            <a:schemeClr val="lt1"/>
-          </a:fontRef>
-        </p:style>
-        <p:txBody>
-          <a:bodyPr rtlCol="0" anchor="t"/>
-          <a:lstStyle/>
-          <a:p>
-            <a:pPr algn="ctr"/>
-            <a:r>
-              <a:rPr lang="en-US" sz="2800" b="1" dirty="0" err="1"/>
-              <a:t>ClassRoom</a:t>
-            </a:r>
-            <a:endParaRPr lang="en-US" sz="2800" b="1" dirty="0"/>
-          </a:p>
-        </p:txBody>
-      </p:sp>
-      <p:cxnSp>
-        <p:nvCxnSpPr>
-          <p:cNvPr id="9" name="Straight Connector 8">
-            <a:extLst>
-              <a:ext uri="{FF2B5EF4-FFF2-40B4-BE49-F238E27FC236}">
-                <a16:creationId xmlns:a16="http://schemas.microsoft.com/office/drawing/2014/main" id="{E11429F3-BBDC-48F6-B48B-FCC8D8E4A2EE}"/>
-              </a:ext>
-            </a:extLst>
-          </p:cNvPr>
-          <p:cNvCxnSpPr>
-            <a:cxnSpLocks/>
-          </p:cNvCxnSpPr>
-          <p:nvPr/>
-        </p:nvCxnSpPr>
-        <p:spPr>
-          <a:xfrm>
-            <a:off x="1598611" y="2751263"/>
-            <a:ext cx="9220200" cy="0"/>
-          </a:xfrm>
-          <a:prstGeom prst="line">
-            <a:avLst/>
-          </a:prstGeom>
-          <a:ln>
-            <a:solidFill>
-              <a:srgbClr val="085091"/>
-            </a:solidFill>
-          </a:ln>
-        </p:spPr>
-        <p:style>
-          <a:lnRef idx="2">
-            <a:schemeClr val="accent1"/>
-          </a:lnRef>
-          <a:fillRef idx="0">
-            <a:schemeClr val="accent1"/>
-          </a:fillRef>
-          <a:effectRef idx="1">
-            <a:schemeClr val="accent1"/>
-          </a:effectRef>
-          <a:fontRef idx="minor">
-            <a:schemeClr val="tx1"/>
-          </a:fontRef>
-        </p:style>
-      </p:cxnSp>
-      <p:sp>
-        <p:nvSpPr>
-          <p:cNvPr id="10" name="TextBox 9">
-            <a:extLst>
-              <a:ext uri="{FF2B5EF4-FFF2-40B4-BE49-F238E27FC236}">
-                <a16:creationId xmlns:a16="http://schemas.microsoft.com/office/drawing/2014/main" id="{35CE8174-F266-457C-A0EE-A6A6EDC5E235}"/>
-              </a:ext>
-            </a:extLst>
-          </p:cNvPr>
-          <p:cNvSpPr txBox="1"/>
-          <p:nvPr/>
-        </p:nvSpPr>
-        <p:spPr>
-          <a:xfrm>
-            <a:off x="1598611" y="2771096"/>
-            <a:ext cx="3977447" cy="830997"/>
-          </a:xfrm>
-          <a:prstGeom prst="rect">
-            <a:avLst/>
-          </a:prstGeom>
-          <a:noFill/>
-        </p:spPr>
-        <p:txBody>
-          <a:bodyPr wrap="square" rtlCol="0">
-            <a:spAutoFit/>
-          </a:bodyPr>
-          <a:lstStyle/>
-          <a:p>
-            <a:r>
-              <a:rPr lang="en-US" dirty="0"/>
-              <a:t>– building: string</a:t>
-            </a:r>
-          </a:p>
-          <a:p>
-            <a:r>
-              <a:rPr lang="en-US" dirty="0"/>
-              <a:t>– number: int</a:t>
-            </a:r>
-          </a:p>
-        </p:txBody>
-      </p:sp>
-      <p:sp>
-        <p:nvSpPr>
-          <p:cNvPr id="11" name="TextBox 10">
-            <a:extLst>
-              <a:ext uri="{FF2B5EF4-FFF2-40B4-BE49-F238E27FC236}">
-                <a16:creationId xmlns:a16="http://schemas.microsoft.com/office/drawing/2014/main" id="{F04E4EE0-39E9-4EED-8D24-25D20D819491}"/>
-              </a:ext>
-            </a:extLst>
-          </p:cNvPr>
-          <p:cNvSpPr txBox="1"/>
-          <p:nvPr/>
-        </p:nvSpPr>
-        <p:spPr>
-          <a:xfrm>
-            <a:off x="1598611" y="3695696"/>
-            <a:ext cx="9296400" cy="1938992"/>
-          </a:xfrm>
-          <a:prstGeom prst="rect">
-            <a:avLst/>
-          </a:prstGeom>
-          <a:noFill/>
-        </p:spPr>
-        <p:txBody>
-          <a:bodyPr wrap="square" rtlCol="0">
-            <a:spAutoFit/>
-          </a:bodyPr>
-          <a:lstStyle/>
-          <a:p>
-            <a:r>
-              <a:rPr lang="en-US" dirty="0"/>
-              <a:t>+ « constructor » </a:t>
-            </a:r>
-            <a:r>
-              <a:rPr lang="en-US" dirty="0" err="1"/>
-              <a:t>ClassRoom</a:t>
-            </a:r>
-            <a:r>
-              <a:rPr lang="en-US" dirty="0"/>
-              <a:t>(</a:t>
-            </a:r>
-            <a:r>
-              <a:rPr lang="en-US" dirty="0" err="1"/>
-              <a:t>buildingParam</a:t>
-            </a:r>
-            <a:r>
-              <a:rPr lang="en-US" dirty="0"/>
-              <a:t>: string, </a:t>
-            </a:r>
-            <a:r>
-              <a:rPr lang="en-US" dirty="0" err="1"/>
-              <a:t>numberParam</a:t>
-            </a:r>
-            <a:r>
-              <a:rPr lang="en-US" dirty="0"/>
-              <a:t>: int)</a:t>
-            </a:r>
-          </a:p>
-          <a:p>
-            <a:r>
-              <a:rPr lang="en-US" dirty="0"/>
-              <a:t>+ </a:t>
-            </a:r>
-            <a:r>
-              <a:rPr lang="en-US" dirty="0" err="1"/>
-              <a:t>SetBuilding</a:t>
-            </a:r>
-            <a:r>
-              <a:rPr lang="en-US" dirty="0"/>
-              <a:t>(</a:t>
-            </a:r>
-            <a:r>
-              <a:rPr lang="en-US" dirty="0" err="1"/>
-              <a:t>buildingParam</a:t>
-            </a:r>
-            <a:r>
-              <a:rPr lang="en-US" dirty="0"/>
-              <a:t>: string)</a:t>
-            </a:r>
-          </a:p>
-          <a:p>
-            <a:r>
-              <a:rPr lang="en-US" dirty="0"/>
-              <a:t>+ </a:t>
-            </a:r>
-            <a:r>
-              <a:rPr lang="en-US" dirty="0" err="1"/>
-              <a:t>GetBuilding</a:t>
-            </a:r>
-            <a:r>
-              <a:rPr lang="en-US" dirty="0"/>
-              <a:t>() : string</a:t>
-            </a:r>
-          </a:p>
-          <a:p>
-            <a:r>
-              <a:rPr lang="en-US" dirty="0"/>
-              <a:t>+ </a:t>
-            </a:r>
-            <a:r>
-              <a:rPr lang="en-US" dirty="0" err="1"/>
-              <a:t>SetNumber</a:t>
-            </a:r>
-            <a:r>
-              <a:rPr lang="en-US" dirty="0"/>
-              <a:t>(</a:t>
-            </a:r>
-            <a:r>
-              <a:rPr lang="en-US" dirty="0" err="1"/>
-              <a:t>numberParam</a:t>
-            </a:r>
-            <a:r>
-              <a:rPr lang="en-US" dirty="0"/>
-              <a:t>: int)</a:t>
-            </a:r>
-          </a:p>
-          <a:p>
-            <a:r>
-              <a:rPr lang="en-US" dirty="0"/>
-              <a:t>+ </a:t>
-            </a:r>
-            <a:r>
-              <a:rPr lang="en-US" dirty="0" err="1"/>
-              <a:t>GetNumber</a:t>
-            </a:r>
-            <a:r>
-              <a:rPr lang="en-US" dirty="0"/>
-              <a:t>() : int</a:t>
-            </a:r>
-          </a:p>
-        </p:txBody>
-      </p:sp>
-      <p:cxnSp>
-        <p:nvCxnSpPr>
-          <p:cNvPr id="12" name="Straight Connector 11">
-            <a:extLst>
-              <a:ext uri="{FF2B5EF4-FFF2-40B4-BE49-F238E27FC236}">
-                <a16:creationId xmlns:a16="http://schemas.microsoft.com/office/drawing/2014/main" id="{2BD0AE0E-7FAA-4B36-A3A5-E985573F2F54}"/>
-              </a:ext>
-            </a:extLst>
-          </p:cNvPr>
-          <p:cNvCxnSpPr>
-            <a:cxnSpLocks/>
-          </p:cNvCxnSpPr>
-          <p:nvPr/>
-        </p:nvCxnSpPr>
-        <p:spPr>
-          <a:xfrm>
-            <a:off x="1598611" y="3657591"/>
-            <a:ext cx="9220200" cy="0"/>
-          </a:xfrm>
-          <a:prstGeom prst="line">
-            <a:avLst/>
-          </a:prstGeom>
-          <a:ln>
-            <a:solidFill>
-              <a:srgbClr val="085091"/>
-            </a:solidFill>
-          </a:ln>
-        </p:spPr>
-        <p:style>
-          <a:lnRef idx="2">
-            <a:schemeClr val="accent1"/>
-          </a:lnRef>
-          <a:fillRef idx="0">
-            <a:schemeClr val="accent1"/>
-          </a:fillRef>
-          <a:effectRef idx="1">
-            <a:schemeClr val="accent1"/>
-          </a:effectRef>
-          <a:fontRef idx="minor">
-            <a:schemeClr val="tx1"/>
-          </a:fontRef>
-        </p:style>
-      </p:cxnSp>
-      <p:sp>
-        <p:nvSpPr>
-          <p:cNvPr id="16" name="TextBox 15">
-            <a:extLst>
-              <a:ext uri="{FF2B5EF4-FFF2-40B4-BE49-F238E27FC236}">
-                <a16:creationId xmlns:a16="http://schemas.microsoft.com/office/drawing/2014/main" id="{A92574E2-72A7-4ABD-9889-594F732D7223}"/>
-              </a:ext>
-            </a:extLst>
-          </p:cNvPr>
-          <p:cNvSpPr txBox="1"/>
-          <p:nvPr/>
-        </p:nvSpPr>
-        <p:spPr>
-          <a:xfrm>
-            <a:off x="9542461" y="4527779"/>
-            <a:ext cx="2362200" cy="1219200"/>
-          </a:xfrm>
-          <a:prstGeom prst="rect">
-            <a:avLst/>
-          </a:prstGeom>
-          <a:noFill/>
-        </p:spPr>
-        <p:txBody>
-          <a:bodyPr wrap="square" rtlCol="0">
-            <a:spAutoFit/>
-          </a:bodyPr>
-          <a:lstStyle/>
-          <a:p>
-            <a:r>
-              <a:rPr lang="en-US" dirty="0"/>
-              <a:t>No return type; </a:t>
-            </a:r>
-            <a:r>
-              <a:rPr lang="en-US" dirty="0" err="1"/>
-              <a:t>ClassRoom</a:t>
-            </a:r>
-            <a:r>
-              <a:rPr lang="en-US" dirty="0"/>
-              <a:t> is the return type</a:t>
-            </a:r>
-          </a:p>
-        </p:txBody>
-      </p:sp>
-      <p:cxnSp>
-        <p:nvCxnSpPr>
-          <p:cNvPr id="22" name="Straight Arrow Connector 21">
-            <a:extLst>
-              <a:ext uri="{FF2B5EF4-FFF2-40B4-BE49-F238E27FC236}">
-                <a16:creationId xmlns:a16="http://schemas.microsoft.com/office/drawing/2014/main" id="{2B56A2D9-FB87-4E91-8D77-7EDCE28E690E}"/>
-              </a:ext>
-            </a:extLst>
-          </p:cNvPr>
-          <p:cNvCxnSpPr>
-            <a:cxnSpLocks/>
-          </p:cNvCxnSpPr>
-          <p:nvPr/>
-        </p:nvCxnSpPr>
-        <p:spPr>
-          <a:xfrm flipH="1" flipV="1">
-            <a:off x="10780711" y="4059301"/>
-            <a:ext cx="190501" cy="542723"/>
-          </a:xfrm>
-          <a:prstGeom prst="straightConnector1">
-            <a:avLst/>
-          </a:prstGeom>
-          <a:ln>
-            <a:tailEnd type="triangle"/>
-          </a:ln>
-        </p:spPr>
-        <p:style>
-          <a:lnRef idx="2">
-            <a:schemeClr val="accent6"/>
-          </a:lnRef>
-          <a:fillRef idx="0">
-            <a:schemeClr val="accent6"/>
-          </a:fillRef>
-          <a:effectRef idx="1">
-            <a:schemeClr val="accent6"/>
-          </a:effectRef>
-          <a:fontRef idx="minor">
-            <a:schemeClr val="tx1"/>
-          </a:fontRef>
-        </p:style>
-      </p:cxnSp>
-      <p:sp>
-        <p:nvSpPr>
-          <p:cNvPr id="32" name="TextBox 31">
-            <a:extLst>
-              <a:ext uri="{FF2B5EF4-FFF2-40B4-BE49-F238E27FC236}">
-                <a16:creationId xmlns:a16="http://schemas.microsoft.com/office/drawing/2014/main" id="{7A156715-7F70-430A-940E-2A58D39350DF}"/>
-              </a:ext>
-            </a:extLst>
-          </p:cNvPr>
-          <p:cNvSpPr txBox="1"/>
-          <p:nvPr/>
-        </p:nvSpPr>
-        <p:spPr>
-          <a:xfrm>
-            <a:off x="684212" y="5712766"/>
-            <a:ext cx="5947462" cy="461665"/>
-          </a:xfrm>
-          <a:prstGeom prst="rect">
-            <a:avLst/>
-          </a:prstGeom>
-          <a:noFill/>
-        </p:spPr>
-        <p:txBody>
-          <a:bodyPr wrap="none" rtlCol="0">
-            <a:spAutoFit/>
-          </a:bodyPr>
-          <a:lstStyle/>
-          <a:p>
-            <a:r>
-              <a:rPr lang="en-US" dirty="0"/>
-              <a:t>Constructor annotation; not really necessary</a:t>
-            </a:r>
-          </a:p>
-        </p:txBody>
-      </p:sp>
-      <p:cxnSp>
-        <p:nvCxnSpPr>
-          <p:cNvPr id="34" name="Straight Arrow Connector 33">
-            <a:extLst>
-              <a:ext uri="{FF2B5EF4-FFF2-40B4-BE49-F238E27FC236}">
-                <a16:creationId xmlns:a16="http://schemas.microsoft.com/office/drawing/2014/main" id="{65D93356-9D63-4FE2-8B88-E0DAB30F9D8E}"/>
-              </a:ext>
-            </a:extLst>
-          </p:cNvPr>
-          <p:cNvCxnSpPr/>
-          <p:nvPr/>
-        </p:nvCxnSpPr>
-        <p:spPr>
-          <a:xfrm flipV="1">
-            <a:off x="912813" y="4059301"/>
-            <a:ext cx="1066799" cy="1734884"/>
-          </a:xfrm>
-          <a:prstGeom prst="straightConnector1">
-            <a:avLst/>
-          </a:prstGeom>
-          <a:ln>
-            <a:tailEnd type="triangle"/>
-          </a:ln>
-        </p:spPr>
-        <p:style>
-          <a:lnRef idx="2">
-            <a:schemeClr val="accent6"/>
-          </a:lnRef>
-          <a:fillRef idx="0">
-            <a:schemeClr val="accent6"/>
-          </a:fillRef>
-          <a:effectRef idx="1">
-            <a:schemeClr val="accent6"/>
-          </a:effectRef>
-          <a:fontRef idx="minor">
-            <a:schemeClr val="tx1"/>
-          </a:fontRef>
-        </p:style>
-      </p:cxnSp>
-    </p:spTree>
-    <p:extLst>
-      <p:ext uri="{BB962C8B-B14F-4D97-AF65-F5344CB8AC3E}">
-        <p14:creationId xmlns:p14="http://schemas.microsoft.com/office/powerpoint/2010/main" val="445534640"/>
-      </p:ext>
-    </p:extLst>
-  </p:cSld>
-  <p:clrMapOvr>
-    <a:masterClrMapping/>
-  </p:clrMapOvr>
-</p:sld>
-</file>
-
-<file path=ppt/slides/slide16.xml><?xml version="1.0" encoding="utf-8"?>
-<p:sld xmlns:a="http://schemas.openxmlformats.org/drawingml/2006/main" xmlns:r="http://schemas.openxmlformats.org/officeDocument/2006/relationships" xmlns:p="http://schemas.openxmlformats.org/presentationml/2006/main">
-  <p:cSld>
-    <p:spTree>
-      <p:nvGrpSpPr>
-        <p:cNvPr id="1" name=""/>
-        <p:cNvGrpSpPr/>
-        <p:nvPr/>
-      </p:nvGrpSpPr>
-      <p:grpSpPr>
-        <a:xfrm>
-          <a:off x="0" y="0"/>
-          <a:ext cx="0" cy="0"/>
-          <a:chOff x="0" y="0"/>
-          <a:chExt cx="0" cy="0"/>
-        </a:xfrm>
-      </p:grpSpPr>
-      <p:sp>
-        <p:nvSpPr>
-          <p:cNvPr id="2" name="Title 1">
-            <a:extLst>
-              <a:ext uri="{FF2B5EF4-FFF2-40B4-BE49-F238E27FC236}">
-                <a16:creationId xmlns:a16="http://schemas.microsoft.com/office/drawing/2014/main" id="{42F1B814-6282-4075-A22A-DC3ABFDC9ED3}"/>
-              </a:ext>
-            </a:extLst>
-          </p:cNvPr>
-          <p:cNvSpPr>
-            <a:spLocks noGrp="1"/>
-          </p:cNvSpPr>
-          <p:nvPr>
-            <p:ph type="title"/>
-          </p:nvPr>
-        </p:nvSpPr>
-        <p:spPr/>
-        <p:txBody>
-          <a:bodyPr/>
-          <a:lstStyle/>
-          <a:p>
-            <a:r>
-              <a:rPr lang="en-US" dirty="0"/>
-              <a:t>Outline</a:t>
-            </a:r>
-          </a:p>
-        </p:txBody>
-      </p:sp>
-      <p:sp>
-        <p:nvSpPr>
-          <p:cNvPr id="3" name="Content Placeholder 2">
-            <a:extLst>
-              <a:ext uri="{FF2B5EF4-FFF2-40B4-BE49-F238E27FC236}">
-                <a16:creationId xmlns:a16="http://schemas.microsoft.com/office/drawing/2014/main" id="{A21C63A1-E39A-4E80-92B5-E2FCBFF8D55C}"/>
-              </a:ext>
-            </a:extLst>
-          </p:cNvPr>
-          <p:cNvSpPr>
-            <a:spLocks noGrp="1"/>
-          </p:cNvSpPr>
-          <p:nvPr>
-            <p:ph idx="1"/>
-          </p:nvPr>
-        </p:nvSpPr>
-        <p:spPr/>
-        <p:txBody>
-          <a:bodyPr/>
-          <a:lstStyle/>
-          <a:p>
-            <a:r>
-              <a:rPr lang="en-US" dirty="0"/>
-              <a:t>Name Uniqueness</a:t>
-            </a:r>
-          </a:p>
-          <a:p>
-            <a:r>
-              <a:rPr lang="en-US" dirty="0"/>
-              <a:t>Signatures and Overloading</a:t>
-            </a:r>
-          </a:p>
-          <a:p>
-            <a:r>
-              <a:rPr lang="en-US" dirty="0"/>
-              <a:t>Constructors in UML</a:t>
-            </a:r>
-          </a:p>
-          <a:p>
-            <a:r>
-              <a:rPr lang="en-US" b="1" dirty="0" smtClean="0"/>
-              <a:t>Properties</a:t>
-            </a:r>
-            <a:endParaRPr lang="en-US" b="1" dirty="0"/>
-          </a:p>
-        </p:txBody>
-      </p:sp>
-      <p:sp>
-        <p:nvSpPr>
-          <p:cNvPr id="4" name="Footer Placeholder 3">
-            <a:extLst>
-              <a:ext uri="{FF2B5EF4-FFF2-40B4-BE49-F238E27FC236}">
-                <a16:creationId xmlns:a16="http://schemas.microsoft.com/office/drawing/2014/main" id="{C185642E-D901-43E9-B9EC-3B1DBFC4E326}"/>
-              </a:ext>
-            </a:extLst>
-          </p:cNvPr>
-          <p:cNvSpPr>
-            <a:spLocks noGrp="1"/>
-          </p:cNvSpPr>
-          <p:nvPr>
-            <p:ph type="ftr" sz="quarter" idx="11"/>
-          </p:nvPr>
-        </p:nvSpPr>
-        <p:spPr/>
-        <p:txBody>
-          <a:bodyPr/>
-          <a:lstStyle/>
-          <a:p>
-            <a:r>
-              <a:rPr lang="en-US"/>
-              <a:t>CSCI 1301</a:t>
-            </a:r>
-          </a:p>
-        </p:txBody>
-      </p:sp>
-    </p:spTree>
-    <p:extLst>
-      <p:ext uri="{BB962C8B-B14F-4D97-AF65-F5344CB8AC3E}">
-        <p14:creationId xmlns:p14="http://schemas.microsoft.com/office/powerpoint/2010/main" val="2094600139"/>
-      </p:ext>
-    </p:extLst>
-  </p:cSld>
-  <p:clrMapOvr>
-    <a:masterClrMapping/>
-  </p:clrMapOvr>
-</p:sld>
-</file>
-
-<file path=ppt/slides/slide17.xml><?xml version="1.0" encoding="utf-8"?>
-<p:sld xmlns:a="http://schemas.openxmlformats.org/drawingml/2006/main" xmlns:r="http://schemas.openxmlformats.org/officeDocument/2006/relationships" xmlns:p="http://schemas.openxmlformats.org/presentationml/2006/main">
-  <p:cSld>
-    <p:spTree>
-      <p:nvGrpSpPr>
-        <p:cNvPr id="1" name=""/>
-        <p:cNvGrpSpPr/>
-        <p:nvPr/>
-      </p:nvGrpSpPr>
-      <p:grpSpPr>
-        <a:xfrm>
-          <a:off x="0" y="0"/>
-          <a:ext cx="0" cy="0"/>
-          <a:chOff x="0" y="0"/>
-          <a:chExt cx="0" cy="0"/>
-        </a:xfrm>
-      </p:grpSpPr>
-      <p:sp>
-        <p:nvSpPr>
           <p:cNvPr id="4" name="Title 3">
             <a:extLst>
               <a:ext uri="{FF2B5EF4-FFF2-40B4-BE49-F238E27FC236}">
@@ -12653,7 +11915,7 @@
 </p:sld>
 </file>
 
-<file path=ppt/slides/slide18.xml><?xml version="1.0" encoding="utf-8"?>
+<file path=ppt/slides/slide16.xml><?xml version="1.0" encoding="utf-8"?>
 <p:sld xmlns:a="http://schemas.openxmlformats.org/drawingml/2006/main" xmlns:r="http://schemas.openxmlformats.org/officeDocument/2006/relationships" xmlns:p="http://schemas.openxmlformats.org/presentationml/2006/main">
   <p:cSld>
     <p:spTree>
@@ -13383,7 +12645,7 @@
 </p:sld>
 </file>
 
-<file path=ppt/slides/slide19.xml><?xml version="1.0" encoding="utf-8"?>
+<file path=ppt/slides/slide17.xml><?xml version="1.0" encoding="utf-8"?>
 <p:sld xmlns:a="http://schemas.openxmlformats.org/drawingml/2006/main" xmlns:r="http://schemas.openxmlformats.org/officeDocument/2006/relationships" xmlns:p="http://schemas.openxmlformats.org/presentationml/2006/main">
   <p:cSld>
     <p:spTree>
@@ -14338,144 +13600,7 @@
 </p:sld>
 </file>
 
-<file path=ppt/slides/slide2.xml><?xml version="1.0" encoding="utf-8"?>
-<p:sld xmlns:a="http://schemas.openxmlformats.org/drawingml/2006/main" xmlns:r="http://schemas.openxmlformats.org/officeDocument/2006/relationships" xmlns:p="http://schemas.openxmlformats.org/presentationml/2006/main">
-  <p:cSld>
-    <p:spTree>
-      <p:nvGrpSpPr>
-        <p:cNvPr id="1" name=""/>
-        <p:cNvGrpSpPr/>
-        <p:nvPr/>
-      </p:nvGrpSpPr>
-      <p:grpSpPr>
-        <a:xfrm>
-          <a:off x="0" y="0"/>
-          <a:ext cx="0" cy="0"/>
-          <a:chOff x="0" y="0"/>
-          <a:chExt cx="0" cy="0"/>
-        </a:xfrm>
-      </p:grpSpPr>
-      <p:sp>
-        <p:nvSpPr>
-          <p:cNvPr id="2" name="Title 1">
-            <a:extLst>
-              <a:ext uri="{FF2B5EF4-FFF2-40B4-BE49-F238E27FC236}">
-                <a16:creationId xmlns:a16="http://schemas.microsoft.com/office/drawing/2014/main" id="{42F1B814-6282-4075-A22A-DC3ABFDC9ED3}"/>
-              </a:ext>
-            </a:extLst>
-          </p:cNvPr>
-          <p:cNvSpPr>
-            <a:spLocks noGrp="1"/>
-          </p:cNvSpPr>
-          <p:nvPr>
-            <p:ph type="title"/>
-          </p:nvPr>
-        </p:nvSpPr>
-        <p:spPr/>
-        <p:txBody>
-          <a:bodyPr/>
-          <a:lstStyle/>
-          <a:p>
-            <a:r>
-              <a:rPr lang="en-US" dirty="0"/>
-              <a:t>Outline</a:t>
-            </a:r>
-          </a:p>
-        </p:txBody>
-      </p:sp>
-      <p:sp>
-        <p:nvSpPr>
-          <p:cNvPr id="3" name="Content Placeholder 2">
-            <a:extLst>
-              <a:ext uri="{FF2B5EF4-FFF2-40B4-BE49-F238E27FC236}">
-                <a16:creationId xmlns:a16="http://schemas.microsoft.com/office/drawing/2014/main" id="{A21C63A1-E39A-4E80-92B5-E2FCBFF8D55C}"/>
-              </a:ext>
-            </a:extLst>
-          </p:cNvPr>
-          <p:cNvSpPr>
-            <a:spLocks noGrp="1"/>
-          </p:cNvSpPr>
-          <p:nvPr>
-            <p:ph idx="1"/>
-          </p:nvPr>
-        </p:nvSpPr>
-        <p:spPr/>
-        <p:txBody>
-          <a:bodyPr/>
-          <a:lstStyle/>
-          <a:p>
-            <a:r>
-              <a:rPr lang="en-US" dirty="0"/>
-              <a:t>Name Uniqueness</a:t>
-            </a:r>
-          </a:p>
-          <a:p>
-            <a:r>
-              <a:rPr lang="en-US" dirty="0"/>
-              <a:t>Signatures and Overloading</a:t>
-            </a:r>
-          </a:p>
-          <a:p>
-            <a:r>
-              <a:rPr lang="en-US" dirty="0"/>
-              <a:t>Constructors in </a:t>
-            </a:r>
-            <a:r>
-              <a:rPr lang="en-US" dirty="0" smtClean="0"/>
-              <a:t>UML</a:t>
-            </a:r>
-          </a:p>
-          <a:p>
-            <a:r>
-              <a:rPr lang="en-US" dirty="0" smtClean="0"/>
-              <a:t>Properties</a:t>
-            </a:r>
-            <a:endParaRPr lang="en-US" dirty="0"/>
-          </a:p>
-        </p:txBody>
-      </p:sp>
-      <p:sp>
-        <p:nvSpPr>
-          <p:cNvPr id="4" name="Footer Placeholder 3">
-            <a:extLst>
-              <a:ext uri="{FF2B5EF4-FFF2-40B4-BE49-F238E27FC236}">
-                <a16:creationId xmlns:a16="http://schemas.microsoft.com/office/drawing/2014/main" id="{C185642E-D901-43E9-B9EC-3B1DBFC4E326}"/>
-              </a:ext>
-            </a:extLst>
-          </p:cNvPr>
-          <p:cNvSpPr>
-            <a:spLocks noGrp="1"/>
-          </p:cNvSpPr>
-          <p:nvPr>
-            <p:ph type="ftr" sz="quarter" idx="11"/>
-          </p:nvPr>
-        </p:nvSpPr>
-        <p:spPr/>
-        <p:txBody>
-          <a:bodyPr/>
-          <a:lstStyle/>
-          <a:p>
-            <a:r>
-              <a:rPr lang="en-US"/>
-              <a:t>CSCI 1301</a:t>
-            </a:r>
-          </a:p>
-        </p:txBody>
-      </p:sp>
-    </p:spTree>
-    <p:extLst>
-      <p:ext uri="{BB962C8B-B14F-4D97-AF65-F5344CB8AC3E}">
-        <p14:creationId xmlns:p14="http://schemas.microsoft.com/office/powerpoint/2010/main" val="905501653"/>
-      </p:ext>
-    </p:extLst>
-  </p:cSld>
-  <p:clrMapOvr>
-    <a:masterClrMapping/>
-  </p:clrMapOvr>
-</p:sld>
-</file>
-
-<file path=ppt/slides/slide20.xml><?xml version="1.0" encoding="utf-8"?>
+<file path=ppt/slides/slide18.xml><?xml version="1.0" encoding="utf-8"?>
 <p:sld xmlns:a="http://schemas.openxmlformats.org/drawingml/2006/main" xmlns:r="http://schemas.openxmlformats.org/officeDocument/2006/relationships" xmlns:p="http://schemas.openxmlformats.org/presentationml/2006/main">
   <p:cSld>
     <p:spTree>
@@ -15129,7 +14254,7 @@
 </p:sld>
 </file>
 
-<file path=ppt/slides/slide21.xml><?xml version="1.0" encoding="utf-8"?>
+<file path=ppt/slides/slide2.xml><?xml version="1.0" encoding="utf-8"?>
 <p:sld xmlns:a="http://schemas.openxmlformats.org/drawingml/2006/main" xmlns:r="http://schemas.openxmlformats.org/officeDocument/2006/relationships" xmlns:p="http://schemas.openxmlformats.org/presentationml/2006/main">
   <p:cSld>
     <p:spTree>
@@ -15169,7 +14294,7 @@
           <a:p>
             <a:r>
               <a:rPr lang="en-US" dirty="0"/>
-              <a:t>Summary</a:t>
+              <a:t>Outline</a:t>
             </a:r>
           </a:p>
         </p:txBody>
@@ -15208,12 +14333,6 @@
           </a:p>
           <a:p>
             <a:r>
-              <a:rPr lang="en-US" dirty="0"/>
-              <a:t>Constructors in UML</a:t>
-            </a:r>
-          </a:p>
-          <a:p>
-            <a:r>
               <a:rPr lang="en-US" dirty="0" smtClean="0"/>
               <a:t>Properties</a:t>
             </a:r>
@@ -15252,7 +14371,7 @@
     </p:spTree>
     <p:extLst>
       <p:ext uri="{BB962C8B-B14F-4D97-AF65-F5344CB8AC3E}">
-        <p14:creationId xmlns:p14="http://schemas.microsoft.com/office/powerpoint/2010/main" val="171752785"/>
+        <p14:creationId xmlns:p14="http://schemas.microsoft.com/office/powerpoint/2010/main" val="905501653"/>
       </p:ext>
     </p:extLst>
   </p:cSld>
@@ -17896,12 +17015,6 @@
             <a:r>
               <a:rPr lang="en-US" b="1" dirty="0"/>
               <a:t>Signatures and Overloading</a:t>
-            </a:r>
-          </a:p>
-          <a:p>
-            <a:r>
-              <a:rPr lang="en-US" dirty="0"/>
-              <a:t>Constructors in UML</a:t>
             </a:r>
           </a:p>
           <a:p>

</xml_diff>